<commit_message>
finished CW attack on ctr
</commit_message>
<xml_diff>
--- a/poster.pptx
+++ b/poster.pptx
@@ -264,7 +264,7 @@
           <a:p>
             <a:fld id="{FD4B236B-4127-4146-99ED-6A730B7745F6}" type="datetimeFigureOut">
               <a:rPr lang="en-US" smtClean="0"/>
-              <a:t>6/6/2019</a:t>
+              <a:t>6/10/2019</a:t>
             </a:fld>
             <a:endParaRPr lang="en-US"/>
           </a:p>
@@ -434,7 +434,7 @@
           <a:p>
             <a:fld id="{FD4B236B-4127-4146-99ED-6A730B7745F6}" type="datetimeFigureOut">
               <a:rPr lang="en-US" smtClean="0"/>
-              <a:t>6/6/2019</a:t>
+              <a:t>6/10/2019</a:t>
             </a:fld>
             <a:endParaRPr lang="en-US"/>
           </a:p>
@@ -614,7 +614,7 @@
           <a:p>
             <a:fld id="{FD4B236B-4127-4146-99ED-6A730B7745F6}" type="datetimeFigureOut">
               <a:rPr lang="en-US" smtClean="0"/>
-              <a:t>6/6/2019</a:t>
+              <a:t>6/10/2019</a:t>
             </a:fld>
             <a:endParaRPr lang="en-US"/>
           </a:p>
@@ -784,7 +784,7 @@
           <a:p>
             <a:fld id="{FD4B236B-4127-4146-99ED-6A730B7745F6}" type="datetimeFigureOut">
               <a:rPr lang="en-US" smtClean="0"/>
-              <a:t>6/6/2019</a:t>
+              <a:t>6/10/2019</a:t>
             </a:fld>
             <a:endParaRPr lang="en-US"/>
           </a:p>
@@ -1028,7 +1028,7 @@
           <a:p>
             <a:fld id="{FD4B236B-4127-4146-99ED-6A730B7745F6}" type="datetimeFigureOut">
               <a:rPr lang="en-US" smtClean="0"/>
-              <a:t>6/6/2019</a:t>
+              <a:t>6/10/2019</a:t>
             </a:fld>
             <a:endParaRPr lang="en-US"/>
           </a:p>
@@ -1260,7 +1260,7 @@
           <a:p>
             <a:fld id="{FD4B236B-4127-4146-99ED-6A730B7745F6}" type="datetimeFigureOut">
               <a:rPr lang="en-US" smtClean="0"/>
-              <a:t>6/6/2019</a:t>
+              <a:t>6/10/2019</a:t>
             </a:fld>
             <a:endParaRPr lang="en-US"/>
           </a:p>
@@ -1627,7 +1627,7 @@
           <a:p>
             <a:fld id="{FD4B236B-4127-4146-99ED-6A730B7745F6}" type="datetimeFigureOut">
               <a:rPr lang="en-US" smtClean="0"/>
-              <a:t>6/6/2019</a:t>
+              <a:t>6/10/2019</a:t>
             </a:fld>
             <a:endParaRPr lang="en-US"/>
           </a:p>
@@ -1745,7 +1745,7 @@
           <a:p>
             <a:fld id="{FD4B236B-4127-4146-99ED-6A730B7745F6}" type="datetimeFigureOut">
               <a:rPr lang="en-US" smtClean="0"/>
-              <a:t>6/6/2019</a:t>
+              <a:t>6/10/2019</a:t>
             </a:fld>
             <a:endParaRPr lang="en-US"/>
           </a:p>
@@ -1840,7 +1840,7 @@
           <a:p>
             <a:fld id="{FD4B236B-4127-4146-99ED-6A730B7745F6}" type="datetimeFigureOut">
               <a:rPr lang="en-US" smtClean="0"/>
-              <a:t>6/6/2019</a:t>
+              <a:t>6/10/2019</a:t>
             </a:fld>
             <a:endParaRPr lang="en-US"/>
           </a:p>
@@ -2117,7 +2117,7 @@
           <a:p>
             <a:fld id="{FD4B236B-4127-4146-99ED-6A730B7745F6}" type="datetimeFigureOut">
               <a:rPr lang="en-US" smtClean="0"/>
-              <a:t>6/6/2019</a:t>
+              <a:t>6/10/2019</a:t>
             </a:fld>
             <a:endParaRPr lang="en-US"/>
           </a:p>
@@ -2374,7 +2374,7 @@
           <a:p>
             <a:fld id="{FD4B236B-4127-4146-99ED-6A730B7745F6}" type="datetimeFigureOut">
               <a:rPr lang="en-US" smtClean="0"/>
-              <a:t>6/6/2019</a:t>
+              <a:t>6/10/2019</a:t>
             </a:fld>
             <a:endParaRPr lang="en-US"/>
           </a:p>
@@ -2587,7 +2587,7 @@
           <a:p>
             <a:fld id="{FD4B236B-4127-4146-99ED-6A730B7745F6}" type="datetimeFigureOut">
               <a:rPr lang="en-US" smtClean="0"/>
-              <a:t>6/6/2019</a:t>
+              <a:t>6/10/2019</a:t>
             </a:fld>
             <a:endParaRPr lang="en-US"/>
           </a:p>
@@ -8550,7 +8550,7 @@
               <p:nvPr>
                 <p:extLst>
                   <p:ext uri="{D42A27DB-BD31-4B8C-83A1-F6EECF244321}">
-                    <p14:modId xmlns:p14="http://schemas.microsoft.com/office/powerpoint/2010/main" val="1219633544"/>
+                    <p14:modId xmlns:p14="http://schemas.microsoft.com/office/powerpoint/2010/main" val="3929535977"/>
                   </p:ext>
                 </p:extLst>
               </p:nvPr>
@@ -14762,11 +14762,14 @@
                         <a:lstStyle/>
                         <a:p>
                           <a:pPr algn="ctr"/>
-                          <a:endParaRPr lang="en-US" sz="3500" dirty="0">
-                            <a:solidFill>
-                              <a:srgbClr val="00B050"/>
-                            </a:solidFill>
-                          </a:endParaRPr>
+                          <a:r>
+                            <a:rPr lang="en-US" sz="3500" dirty="0">
+                              <a:solidFill>
+                                <a:srgbClr val="00B050"/>
+                              </a:solidFill>
+                            </a:rPr>
+                            <a:t>18.70</a:t>
+                          </a:r>
                         </a:p>
                       </a:txBody>
                       <a:tcPr anchor="ctr">
@@ -15187,6 +15190,14 @@
                         <a:lstStyle/>
                         <a:p>
                           <a:pPr algn="ctr"/>
+                          <a:r>
+                            <a:rPr lang="en-US" sz="3500">
+                              <a:solidFill>
+                                <a:srgbClr val="00B050"/>
+                              </a:solidFill>
+                            </a:rPr>
+                            <a:t>17.80</a:t>
+                          </a:r>
                           <a:endParaRPr lang="en-US" sz="3500" dirty="0">
                             <a:solidFill>
                               <a:srgbClr val="00B050"/>
@@ -16083,7 +16094,7 @@
               <p:nvPr>
                 <p:extLst>
                   <p:ext uri="{D42A27DB-BD31-4B8C-83A1-F6EECF244321}">
-                    <p14:modId xmlns:p14="http://schemas.microsoft.com/office/powerpoint/2010/main" val="1219633544"/>
+                    <p14:modId xmlns:p14="http://schemas.microsoft.com/office/powerpoint/2010/main" val="3929535977"/>
                   </p:ext>
                 </p:extLst>
               </p:nvPr>
@@ -22097,11 +22108,14 @@
                         <a:lstStyle/>
                         <a:p>
                           <a:pPr algn="ctr"/>
-                          <a:endParaRPr lang="en-US" sz="3500" dirty="0">
-                            <a:solidFill>
-                              <a:srgbClr val="00B050"/>
-                            </a:solidFill>
-                          </a:endParaRPr>
+                          <a:r>
+                            <a:rPr lang="en-US" sz="3500" dirty="0">
+                              <a:solidFill>
+                                <a:srgbClr val="00B050"/>
+                              </a:solidFill>
+                            </a:rPr>
+                            <a:t>18.70</a:t>
+                          </a:r>
                         </a:p>
                       </a:txBody>
                       <a:tcPr anchor="ctr">
@@ -22488,6 +22502,14 @@
                         <a:lstStyle/>
                         <a:p>
                           <a:pPr algn="ctr"/>
+                          <a:r>
+                            <a:rPr lang="en-US" sz="3500">
+                              <a:solidFill>
+                                <a:srgbClr val="00B050"/>
+                              </a:solidFill>
+                            </a:rPr>
+                            <a:t>17.80</a:t>
+                          </a:r>
                           <a:endParaRPr lang="en-US" sz="3500" dirty="0">
                             <a:solidFill>
                               <a:srgbClr val="00B050"/>
@@ -23431,10 +23453,10 @@
       </p:sp>
       <p:graphicFrame>
         <p:nvGraphicFramePr>
-          <p:cNvPr id="114" name="Table 113">
+          <p:cNvPr id="111" name="Table 110">
             <a:extLst>
               <a:ext uri="{FF2B5EF4-FFF2-40B4-BE49-F238E27FC236}">
-                <a16:creationId xmlns:a16="http://schemas.microsoft.com/office/drawing/2014/main" id="{1F14B970-BBEC-495B-9415-28942C53746F}"/>
+                <a16:creationId xmlns:a16="http://schemas.microsoft.com/office/drawing/2014/main" id="{256B0E97-9FC0-4336-A0AA-EF10AB8858AB}"/>
               </a:ext>
             </a:extLst>
           </p:cNvPr>
@@ -23444,14 +23466,14 @@
           <p:nvPr>
             <p:extLst>
               <p:ext uri="{D42A27DB-BD31-4B8C-83A1-F6EECF244321}">
-                <p14:modId xmlns:p14="http://schemas.microsoft.com/office/powerpoint/2010/main" val="1752010781"/>
+                <p14:modId xmlns:p14="http://schemas.microsoft.com/office/powerpoint/2010/main" val="2649121743"/>
               </p:ext>
             </p:extLst>
           </p:nvPr>
         </p:nvGraphicFramePr>
         <p:xfrm>
           <a:off x="6120000" y="39593515"/>
-          <a:ext cx="20160000" cy="1737360"/>
+          <a:ext cx="20160000" cy="1738800"/>
         </p:xfrm>
         <a:graphic>
           <a:graphicData uri="http://schemas.openxmlformats.org/drawingml/2006/table">
@@ -23482,7 +23504,7 @@
                   </a:extLst>
                 </a:gridCol>
               </a:tblGrid>
-              <a:tr h="370840">
+              <a:tr h="1738800">
                 <a:tc>
                   <a:txBody>
                     <a:bodyPr/>
@@ -23572,7 +23594,7 @@
                         <a:buChar char="•"/>
                       </a:pPr>
                       <a:r>
-                        <a:rPr lang="en-US" sz="3600" b="0" dirty="0">
+                        <a:rPr lang="en-US" sz="3500" b="0" dirty="0">
                           <a:ln>
                             <a:noFill/>
                           </a:ln>
@@ -23583,7 +23605,7 @@
                         <a:t>Nicholas </a:t>
                       </a:r>
                       <a:r>
-                        <a:rPr lang="en-US" sz="3600" b="0" dirty="0" err="1">
+                        <a:rPr lang="en-US" sz="3500" b="0" dirty="0" err="1">
                           <a:ln>
                             <a:noFill/>
                           </a:ln>
@@ -23594,7 +23616,7 @@
                         <a:t>Carlini</a:t>
                       </a:r>
                       <a:r>
-                        <a:rPr lang="en-US" sz="3600" b="0" dirty="0">
+                        <a:rPr lang="en-US" sz="3500" b="0" dirty="0">
                           <a:ln>
                             <a:noFill/>
                           </a:ln>
@@ -23602,16 +23624,8 @@
                             <a:schemeClr val="tx1"/>
                           </a:solidFill>
                         </a:rPr>
-                        <a:t> (the ‘C’ in CW) believes we still might defeat these defenses</a:t>
+                        <a:t> (‘C’ in CW) believes that CW might still defeat these defenses</a:t>
                       </a:r>
-                      <a:endParaRPr lang="en-US" sz="3500" b="0" dirty="0">
-                        <a:ln>
-                          <a:noFill/>
-                        </a:ln>
-                        <a:solidFill>
-                          <a:schemeClr val="tx1"/>
-                        </a:solidFill>
-                      </a:endParaRPr>
                     </a:p>
                   </a:txBody>
                   <a:tcPr anchor="ctr">
@@ -23667,25 +23681,12 @@
                     <a:bodyPr/>
                     <a:lstStyle/>
                     <a:p>
-                      <a:pPr marL="571500" marR="0" lvl="0" indent="-571500" algn="ctr" defTabSz="3239902" rtl="0" eaLnBrk="1" fontAlgn="auto" latinLnBrk="0" hangingPunct="1">
-                        <a:lnSpc>
-                          <a:spcPct val="100000"/>
-                        </a:lnSpc>
-                        <a:spcBef>
-                          <a:spcPts val="0"/>
-                        </a:spcBef>
-                        <a:spcAft>
-                          <a:spcPts val="0"/>
-                        </a:spcAft>
-                        <a:buClrTx/>
-                        <a:buSzTx/>
+                      <a:pPr marL="457200" indent="-457200" algn="ctr">
                         <a:buFont typeface="Arial" panose="020B0604020202020204" pitchFamily="34" charset="0"/>
                         <a:buChar char="•"/>
-                        <a:tabLst/>
-                        <a:defRPr/>
                       </a:pPr>
                       <a:r>
-                        <a:rPr lang="en-US" sz="3600" b="0" dirty="0">
+                        <a:rPr lang="en-US" sz="3500" b="0" dirty="0">
                           <a:ln>
                             <a:noFill/>
                           </a:ln>
@@ -23695,17 +23696,6 @@
                         </a:rPr>
                         <a:t>Test on more complicated datasets; i.e. Cifar-10</a:t>
                       </a:r>
-                    </a:p>
-                    <a:p>
-                      <a:pPr algn="ctr"/>
-                      <a:endParaRPr lang="en-US" sz="3500" b="0" dirty="0">
-                        <a:ln>
-                          <a:noFill/>
-                        </a:ln>
-                        <a:solidFill>
-                          <a:schemeClr val="tx1"/>
-                        </a:solidFill>
-                      </a:endParaRPr>
                     </a:p>
                   </a:txBody>
                   <a:tcPr anchor="ctr">

</xml_diff>